<commit_message>
Changes the last slide of the CoP ppt
</commit_message>
<xml_diff>
--- a/presentations/cop-presentation-1.pptx
+++ b/presentations/cop-presentation-1.pptx
@@ -174,7 +174,7 @@
           <a:p>
             <a:fld id="{EEB7E045-312A-4872-BE37-B0650E44AF50}" type="datetimeFigureOut">
               <a:rPr lang="en-US" smtClean="0"/>
-              <a:t>3/27/2014</a:t>
+              <a:t>4/1/2014</a:t>
             </a:fld>
             <a:endParaRPr lang="en-US" dirty="0"/>
           </a:p>
@@ -490,7 +490,7 @@
           <a:p>
             <a:fld id="{EEB7E045-312A-4872-BE37-B0650E44AF50}" type="datetimeFigureOut">
               <a:rPr lang="en-US" smtClean="0"/>
-              <a:t>3/27/2014</a:t>
+              <a:t>4/1/2014</a:t>
             </a:fld>
             <a:endParaRPr lang="en-US" dirty="0"/>
           </a:p>
@@ -665,7 +665,7 @@
           <a:p>
             <a:fld id="{EEB7E045-312A-4872-BE37-B0650E44AF50}" type="datetimeFigureOut">
               <a:rPr lang="en-US" smtClean="0"/>
-              <a:t>3/27/2014</a:t>
+              <a:t>4/1/2014</a:t>
             </a:fld>
             <a:endParaRPr lang="en-US" dirty="0"/>
           </a:p>
@@ -783,7 +783,7 @@
           <a:p>
             <a:fld id="{EEB7E045-312A-4872-BE37-B0650E44AF50}" type="datetimeFigureOut">
               <a:rPr lang="en-US" smtClean="0"/>
-              <a:t>3/27/2014</a:t>
+              <a:t>4/1/2014</a:t>
             </a:fld>
             <a:endParaRPr lang="en-US" dirty="0"/>
           </a:p>
@@ -1081,7 +1081,7 @@
           <a:p>
             <a:fld id="{EEB7E045-312A-4872-BE37-B0650E44AF50}" type="datetimeFigureOut">
               <a:rPr lang="en-US" smtClean="0"/>
-              <a:t>3/27/2014</a:t>
+              <a:t>4/1/2014</a:t>
             </a:fld>
             <a:endParaRPr lang="en-US" dirty="0"/>
           </a:p>
@@ -1374,7 +1374,7 @@
           <a:p>
             <a:fld id="{EEB7E045-312A-4872-BE37-B0650E44AF50}" type="datetimeFigureOut">
               <a:rPr lang="en-US" smtClean="0"/>
-              <a:t>3/27/2014</a:t>
+              <a:t>4/1/2014</a:t>
             </a:fld>
             <a:endParaRPr lang="en-US" dirty="0"/>
           </a:p>
@@ -1802,7 +1802,7 @@
           <a:p>
             <a:fld id="{EEB7E045-312A-4872-BE37-B0650E44AF50}" type="datetimeFigureOut">
               <a:rPr lang="en-US" smtClean="0"/>
-              <a:t>3/27/2014</a:t>
+              <a:t>4/1/2014</a:t>
             </a:fld>
             <a:endParaRPr lang="en-US" dirty="0"/>
           </a:p>
@@ -1920,7 +1920,7 @@
           <a:p>
             <a:fld id="{EEB7E045-312A-4872-BE37-B0650E44AF50}" type="datetimeFigureOut">
               <a:rPr lang="en-US" smtClean="0"/>
-              <a:t>3/27/2014</a:t>
+              <a:t>4/1/2014</a:t>
             </a:fld>
             <a:endParaRPr lang="en-US" dirty="0"/>
           </a:p>
@@ -2010,7 +2010,7 @@
           <a:p>
             <a:fld id="{EEB7E045-312A-4872-BE37-B0650E44AF50}" type="datetimeFigureOut">
               <a:rPr lang="en-US" smtClean="0"/>
-              <a:t>3/27/2014</a:t>
+              <a:t>4/1/2014</a:t>
             </a:fld>
             <a:endParaRPr lang="en-US" dirty="0"/>
           </a:p>
@@ -2260,7 +2260,7 @@
           <a:p>
             <a:fld id="{EEB7E045-312A-4872-BE37-B0650E44AF50}" type="datetimeFigureOut">
               <a:rPr lang="en-US" smtClean="0"/>
-              <a:t>3/27/2014</a:t>
+              <a:t>4/1/2014</a:t>
             </a:fld>
             <a:endParaRPr lang="en-US" dirty="0"/>
           </a:p>
@@ -2776,7 +2776,7 @@
           <a:p>
             <a:fld id="{EEB7E045-312A-4872-BE37-B0650E44AF50}" type="datetimeFigureOut">
               <a:rPr lang="en-US" smtClean="0"/>
-              <a:t>3/27/2014</a:t>
+              <a:t>4/1/2014</a:t>
             </a:fld>
             <a:endParaRPr lang="en-US" dirty="0"/>
           </a:p>
@@ -3006,7 +3006,7 @@
           <a:p>
             <a:fld id="{EEB7E045-312A-4872-BE37-B0650E44AF50}" type="datetimeFigureOut">
               <a:rPr lang="en-US" smtClean="0"/>
-              <a:t>3/27/2014</a:t>
+              <a:t>4/1/2014</a:t>
             </a:fld>
             <a:endParaRPr lang="en-US" dirty="0"/>
           </a:p>
@@ -3614,13 +3614,13 @@
   <p:clrMapOvr>
     <a:masterClrMapping/>
   </p:clrMapOvr>
-  <mc:AlternateContent xmlns:mc="http://schemas.openxmlformats.org/markup-compatibility/2006">
-    <mc:Choice xmlns:p14="http://schemas.microsoft.com/office/powerpoint/2010/main" Requires="p14">
+  <mc:AlternateContent xmlns:mc="http://schemas.openxmlformats.org/markup-compatibility/2006" xmlns:p14="http://schemas.microsoft.com/office/powerpoint/2010/main">
+    <mc:Choice Requires="p14">
       <p:transition spd="slow" p14:dur="2500">
         <p:checker/>
       </p:transition>
     </mc:Choice>
-    <mc:Fallback>
+    <mc:Fallback xmlns="">
       <p:transition spd="slow">
         <p:checker/>
       </p:transition>
@@ -4089,7 +4089,6 @@
               <a:rPr lang="en-US" b="1" dirty="0"/>
               <a:t>role descriptions</a:t>
             </a:r>
-            <a:endParaRPr lang="en-US" b="1" dirty="0"/>
           </a:p>
         </p:txBody>
       </p:sp>
@@ -5128,7 +5127,7 @@
           <a:graphicData uri="http://schemas.openxmlformats.org/presentationml/2006/ole">
             <mc:AlternateContent xmlns:mc="http://schemas.openxmlformats.org/markup-compatibility/2006">
               <mc:Choice xmlns:v="urn:schemas-microsoft-com:vml" Requires="v">
-                <p:oleObj spid="_x0000_s1032" name="Acrobat Document" r:id="rId3" imgW="6857865" imgH="6858000" progId="AcroExch.Document.7">
+                <p:oleObj spid="_x0000_s1036" name="Acrobat Document" r:id="rId3" imgW="6857865" imgH="6858000" progId="AcroExch.Document.7">
                   <p:embed/>
                 </p:oleObj>
               </mc:Choice>
@@ -5185,7 +5184,7 @@
           <a:graphicData uri="http://schemas.openxmlformats.org/presentationml/2006/ole">
             <mc:AlternateContent xmlns:mc="http://schemas.openxmlformats.org/markup-compatibility/2006">
               <mc:Choice xmlns:v="urn:schemas-microsoft-com:vml" Requires="v">
-                <p:oleObj spid="_x0000_s1033" name="Acrobat Document" r:id="rId5" imgW="6857865" imgH="6858000" progId="AcroExch.Document.7">
+                <p:oleObj spid="_x0000_s1037" name="Acrobat Document" r:id="rId5" imgW="6857865" imgH="6858000" progId="AcroExch.Document.7">
                   <p:embed/>
                 </p:oleObj>
               </mc:Choice>
@@ -5808,10 +5807,39 @@
           </a:lstStyle>
           <a:p>
             <a:r>
-              <a:rPr lang="en-US" dirty="0" smtClean="0"/>
-              <a:t>T</a:t>
-            </a:r>
-            <a:endParaRPr lang="en-US" b="1" dirty="0"/>
+              <a:rPr lang="sv-SE" dirty="0" smtClean="0"/>
+              <a:t>Void of responsibilities</a:t>
+            </a:r>
+          </a:p>
+          <a:p>
+            <a:r>
+              <a:rPr lang="sv-SE" dirty="0"/>
+              <a:t>Responsibility overhead for an </a:t>
+            </a:r>
+            <a:r>
+              <a:rPr lang="sv-SE" dirty="0" smtClean="0"/>
+              <a:t>XFT</a:t>
+            </a:r>
+            <a:endParaRPr lang="sv-SE" dirty="0" smtClean="0"/>
+          </a:p>
+          <a:p>
+            <a:r>
+              <a:rPr lang="sv-SE" dirty="0" smtClean="0"/>
+              <a:t>Information overflow</a:t>
+            </a:r>
+          </a:p>
+          <a:p>
+            <a:r>
+              <a:rPr lang="sv-SE" dirty="0" smtClean="0"/>
+              <a:t>Unnatural communication</a:t>
+            </a:r>
+          </a:p>
+          <a:p>
+            <a:r>
+              <a:rPr lang="sv-SE" dirty="0" smtClean="0"/>
+              <a:t>Lack of vision</a:t>
+            </a:r>
+            <a:endParaRPr lang="en-US" dirty="0"/>
           </a:p>
         </p:txBody>
       </p:sp>

</xml_diff>